<commit_message>
Initial analysis of enzyme chapter
</commit_message>
<xml_diff>
--- a/fish_colors.pptx
+++ b/fish_colors.pptx
@@ -126,6 +126,50 @@
 </p:presentation>
 </file>
 
+<file path=ppt/changesInfos/changesInfo1.xml><?xml version="1.0" encoding="utf-8"?>
+<pc:chgInfo xmlns:a="http://schemas.openxmlformats.org/drawingml/2006/main" xmlns:r="http://schemas.openxmlformats.org/officeDocument/2006/relationships" xmlns:ac="http://schemas.microsoft.com/office/drawing/2013/main/command" xmlns:pc="http://schemas.microsoft.com/office/powerpoint/2013/main/command">
+  <pc:docChgLst>
+    <pc:chgData name="Elliott Schmidt" userId="7d7bc755-a82b-4542-b81e-1920d1eab289" providerId="ADAL" clId="{47D066A0-6E97-4A43-91E8-D2720E75F930}"/>
+    <pc:docChg chg="modSld">
+      <pc:chgData name="Elliott Schmidt" userId="7d7bc755-a82b-4542-b81e-1920d1eab289" providerId="ADAL" clId="{47D066A0-6E97-4A43-91E8-D2720E75F930}" dt="2024-01-29T04:49:51.919" v="2" actId="207"/>
+      <pc:docMkLst>
+        <pc:docMk/>
+      </pc:docMkLst>
+      <pc:sldChg chg="modSp mod">
+        <pc:chgData name="Elliott Schmidt" userId="7d7bc755-a82b-4542-b81e-1920d1eab289" providerId="ADAL" clId="{47D066A0-6E97-4A43-91E8-D2720E75F930}" dt="2024-01-29T04:49:28.615" v="0" actId="207"/>
+        <pc:sldMkLst>
+          <pc:docMk/>
+          <pc:sldMk cId="10921595" sldId="257"/>
+        </pc:sldMkLst>
+        <pc:spChg chg="mod">
+          <ac:chgData name="Elliott Schmidt" userId="7d7bc755-a82b-4542-b81e-1920d1eab289" providerId="ADAL" clId="{47D066A0-6E97-4A43-91E8-D2720E75F930}" dt="2024-01-29T04:49:28.615" v="0" actId="207"/>
+          <ac:spMkLst>
+            <pc:docMk/>
+            <pc:sldMk cId="10921595" sldId="257"/>
+            <ac:spMk id="4" creationId="{E170454E-13DE-6567-DBAD-0556B7E3B298}"/>
+          </ac:spMkLst>
+        </pc:spChg>
+      </pc:sldChg>
+      <pc:sldChg chg="modSp mod">
+        <pc:chgData name="Elliott Schmidt" userId="7d7bc755-a82b-4542-b81e-1920d1eab289" providerId="ADAL" clId="{47D066A0-6E97-4A43-91E8-D2720E75F930}" dt="2024-01-29T04:49:51.919" v="2" actId="207"/>
+        <pc:sldMkLst>
+          <pc:docMk/>
+          <pc:sldMk cId="1698786569" sldId="258"/>
+        </pc:sldMkLst>
+        <pc:spChg chg="mod">
+          <ac:chgData name="Elliott Schmidt" userId="7d7bc755-a82b-4542-b81e-1920d1eab289" providerId="ADAL" clId="{47D066A0-6E97-4A43-91E8-D2720E75F930}" dt="2024-01-29T04:49:51.919" v="2" actId="207"/>
+          <ac:spMkLst>
+            <pc:docMk/>
+            <pc:sldMk cId="1698786569" sldId="258"/>
+            <ac:spMk id="4" creationId="{E170454E-13DE-6567-DBAD-0556B7E3B298}"/>
+          </ac:spMkLst>
+        </pc:spChg>
+      </pc:sldChg>
+    </pc:docChg>
+  </pc:docChgLst>
+</pc:chgInfo>
+</file>
+
 <file path=ppt/slideLayouts/slideLayout1.xml><?xml version="1.0" encoding="utf-8"?>
 <p:sldLayout xmlns:a="http://schemas.openxmlformats.org/drawingml/2006/main" xmlns:r="http://schemas.openxmlformats.org/officeDocument/2006/relationships" xmlns:p="http://schemas.openxmlformats.org/presentationml/2006/main" type="title" preserve="1">
   <p:cSld name="Title Slide">
@@ -275,7 +319,7 @@
           <a:p>
             <a:fld id="{0E54B504-489F-440D-9D1F-814B0344983C}" type="datetimeFigureOut">
               <a:rPr lang="en-AU" smtClean="0"/>
-              <a:t>19/12/2023</a:t>
+              <a:t>29/01/2024</a:t>
             </a:fld>
             <a:endParaRPr lang="en-AU"/>
           </a:p>
@@ -475,7 +519,7 @@
           <a:p>
             <a:fld id="{0E54B504-489F-440D-9D1F-814B0344983C}" type="datetimeFigureOut">
               <a:rPr lang="en-AU" smtClean="0"/>
-              <a:t>19/12/2023</a:t>
+              <a:t>29/01/2024</a:t>
             </a:fld>
             <a:endParaRPr lang="en-AU"/>
           </a:p>
@@ -685,7 +729,7 @@
           <a:p>
             <a:fld id="{0E54B504-489F-440D-9D1F-814B0344983C}" type="datetimeFigureOut">
               <a:rPr lang="en-AU" smtClean="0"/>
-              <a:t>19/12/2023</a:t>
+              <a:t>29/01/2024</a:t>
             </a:fld>
             <a:endParaRPr lang="en-AU"/>
           </a:p>
@@ -885,7 +929,7 @@
           <a:p>
             <a:fld id="{0E54B504-489F-440D-9D1F-814B0344983C}" type="datetimeFigureOut">
               <a:rPr lang="en-AU" smtClean="0"/>
-              <a:t>19/12/2023</a:t>
+              <a:t>29/01/2024</a:t>
             </a:fld>
             <a:endParaRPr lang="en-AU"/>
           </a:p>
@@ -1161,7 +1205,7 @@
           <a:p>
             <a:fld id="{0E54B504-489F-440D-9D1F-814B0344983C}" type="datetimeFigureOut">
               <a:rPr lang="en-AU" smtClean="0"/>
-              <a:t>19/12/2023</a:t>
+              <a:t>29/01/2024</a:t>
             </a:fld>
             <a:endParaRPr lang="en-AU"/>
           </a:p>
@@ -1429,7 +1473,7 @@
           <a:p>
             <a:fld id="{0E54B504-489F-440D-9D1F-814B0344983C}" type="datetimeFigureOut">
               <a:rPr lang="en-AU" smtClean="0"/>
-              <a:t>19/12/2023</a:t>
+              <a:t>29/01/2024</a:t>
             </a:fld>
             <a:endParaRPr lang="en-AU"/>
           </a:p>
@@ -1844,7 +1888,7 @@
           <a:p>
             <a:fld id="{0E54B504-489F-440D-9D1F-814B0344983C}" type="datetimeFigureOut">
               <a:rPr lang="en-AU" smtClean="0"/>
-              <a:t>19/12/2023</a:t>
+              <a:t>29/01/2024</a:t>
             </a:fld>
             <a:endParaRPr lang="en-AU"/>
           </a:p>
@@ -1986,7 +2030,7 @@
           <a:p>
             <a:fld id="{0E54B504-489F-440D-9D1F-814B0344983C}" type="datetimeFigureOut">
               <a:rPr lang="en-AU" smtClean="0"/>
-              <a:t>19/12/2023</a:t>
+              <a:t>29/01/2024</a:t>
             </a:fld>
             <a:endParaRPr lang="en-AU"/>
           </a:p>
@@ -2099,7 +2143,7 @@
           <a:p>
             <a:fld id="{0E54B504-489F-440D-9D1F-814B0344983C}" type="datetimeFigureOut">
               <a:rPr lang="en-AU" smtClean="0"/>
-              <a:t>19/12/2023</a:t>
+              <a:t>29/01/2024</a:t>
             </a:fld>
             <a:endParaRPr lang="en-AU"/>
           </a:p>
@@ -2412,7 +2456,7 @@
           <a:p>
             <a:fld id="{0E54B504-489F-440D-9D1F-814B0344983C}" type="datetimeFigureOut">
               <a:rPr lang="en-AU" smtClean="0"/>
-              <a:t>19/12/2023</a:t>
+              <a:t>29/01/2024</a:t>
             </a:fld>
             <a:endParaRPr lang="en-AU"/>
           </a:p>
@@ -2701,7 +2745,7 @@
           <a:p>
             <a:fld id="{0E54B504-489F-440D-9D1F-814B0344983C}" type="datetimeFigureOut">
               <a:rPr lang="en-AU" smtClean="0"/>
-              <a:t>19/12/2023</a:t>
+              <a:t>29/01/2024</a:t>
             </a:fld>
             <a:endParaRPr lang="en-AU"/>
           </a:p>
@@ -2944,7 +2988,7 @@
           <a:p>
             <a:fld id="{0E54B504-489F-440D-9D1F-814B0344983C}" type="datetimeFigureOut">
               <a:rPr lang="en-AU" smtClean="0"/>
-              <a:t>19/12/2023</a:t>
+              <a:t>29/01/2024</a:t>
             </a:fld>
             <a:endParaRPr lang="en-AU"/>
           </a:p>
@@ -3546,7 +3590,7 @@
             <a:avLst/>
           </a:prstGeom>
           <a:solidFill>
-            <a:srgbClr val="C65C1B"/>
+            <a:srgbClr val="AB5311"/>
           </a:solidFill>
         </p:spPr>
         <p:style>
@@ -3625,8 +3669,13 @@
             <a:avLst/>
           </a:prstGeom>
           <a:solidFill>
-            <a:srgbClr val="5D79FF"/>
+            <a:srgbClr val="07AFF2"/>
           </a:solidFill>
+          <a:ln>
+            <a:solidFill>
+              <a:srgbClr val="07AFF2"/>
+            </a:solidFill>
+          </a:ln>
         </p:spPr>
         <p:style>
           <a:lnRef idx="2">

</xml_diff>